<commit_message>
First DB call working, user editing work begun
</commit_message>
<xml_diff>
--- a/Concept.pptx
+++ b/Concept.pptx
@@ -7,6 +7,7 @@
   <p:sldIdLst>
     <p:sldId id="256" r:id="rId2"/>
     <p:sldId id="257" r:id="rId3"/>
+    <p:sldId id="258" r:id="rId4"/>
   </p:sldIdLst>
   <p:sldSz cx="12192000" cy="6858000"/>
   <p:notesSz cx="6858000" cy="9144000"/>
@@ -105,6 +106,11 @@
       </a:defRPr>
     </a:lvl9pPr>
   </p:defaultTextStyle>
+  <p:extLst>
+    <p:ext uri="{EFAFB233-063F-42B5-8137-9DF3F51BA10A}">
+      <p15:sldGuideLst xmlns:p15="http://schemas.microsoft.com/office/powerpoint/2012/main"/>
+    </p:ext>
+  </p:extLst>
 </p:presentation>
 </file>
 
@@ -257,7 +263,7 @@
           <a:p>
             <a:fld id="{CB8F57B5-8C2E-48A7-B7E0-7AAEE0FC24D8}" type="datetimeFigureOut">
               <a:rPr lang="da-DK" smtClean="0"/>
-              <a:t>14-08-2023</a:t>
+              <a:t>31-08-2023</a:t>
             </a:fld>
             <a:endParaRPr lang="da-DK"/>
           </a:p>
@@ -457,7 +463,7 @@
           <a:p>
             <a:fld id="{CB8F57B5-8C2E-48A7-B7E0-7AAEE0FC24D8}" type="datetimeFigureOut">
               <a:rPr lang="da-DK" smtClean="0"/>
-              <a:t>14-08-2023</a:t>
+              <a:t>31-08-2023</a:t>
             </a:fld>
             <a:endParaRPr lang="da-DK"/>
           </a:p>
@@ -667,7 +673,7 @@
           <a:p>
             <a:fld id="{CB8F57B5-8C2E-48A7-B7E0-7AAEE0FC24D8}" type="datetimeFigureOut">
               <a:rPr lang="da-DK" smtClean="0"/>
-              <a:t>14-08-2023</a:t>
+              <a:t>31-08-2023</a:t>
             </a:fld>
             <a:endParaRPr lang="da-DK"/>
           </a:p>
@@ -867,7 +873,7 @@
           <a:p>
             <a:fld id="{CB8F57B5-8C2E-48A7-B7E0-7AAEE0FC24D8}" type="datetimeFigureOut">
               <a:rPr lang="da-DK" smtClean="0"/>
-              <a:t>14-08-2023</a:t>
+              <a:t>31-08-2023</a:t>
             </a:fld>
             <a:endParaRPr lang="da-DK"/>
           </a:p>
@@ -1143,7 +1149,7 @@
           <a:p>
             <a:fld id="{CB8F57B5-8C2E-48A7-B7E0-7AAEE0FC24D8}" type="datetimeFigureOut">
               <a:rPr lang="da-DK" smtClean="0"/>
-              <a:t>14-08-2023</a:t>
+              <a:t>31-08-2023</a:t>
             </a:fld>
             <a:endParaRPr lang="da-DK"/>
           </a:p>
@@ -1411,7 +1417,7 @@
           <a:p>
             <a:fld id="{CB8F57B5-8C2E-48A7-B7E0-7AAEE0FC24D8}" type="datetimeFigureOut">
               <a:rPr lang="da-DK" smtClean="0"/>
-              <a:t>14-08-2023</a:t>
+              <a:t>31-08-2023</a:t>
             </a:fld>
             <a:endParaRPr lang="da-DK"/>
           </a:p>
@@ -1826,7 +1832,7 @@
           <a:p>
             <a:fld id="{CB8F57B5-8C2E-48A7-B7E0-7AAEE0FC24D8}" type="datetimeFigureOut">
               <a:rPr lang="da-DK" smtClean="0"/>
-              <a:t>14-08-2023</a:t>
+              <a:t>31-08-2023</a:t>
             </a:fld>
             <a:endParaRPr lang="da-DK"/>
           </a:p>
@@ -1968,7 +1974,7 @@
           <a:p>
             <a:fld id="{CB8F57B5-8C2E-48A7-B7E0-7AAEE0FC24D8}" type="datetimeFigureOut">
               <a:rPr lang="da-DK" smtClean="0"/>
-              <a:t>14-08-2023</a:t>
+              <a:t>31-08-2023</a:t>
             </a:fld>
             <a:endParaRPr lang="da-DK"/>
           </a:p>
@@ -2081,7 +2087,7 @@
           <a:p>
             <a:fld id="{CB8F57B5-8C2E-48A7-B7E0-7AAEE0FC24D8}" type="datetimeFigureOut">
               <a:rPr lang="da-DK" smtClean="0"/>
-              <a:t>14-08-2023</a:t>
+              <a:t>31-08-2023</a:t>
             </a:fld>
             <a:endParaRPr lang="da-DK"/>
           </a:p>
@@ -2394,7 +2400,7 @@
           <a:p>
             <a:fld id="{CB8F57B5-8C2E-48A7-B7E0-7AAEE0FC24D8}" type="datetimeFigureOut">
               <a:rPr lang="da-DK" smtClean="0"/>
-              <a:t>14-08-2023</a:t>
+              <a:t>31-08-2023</a:t>
             </a:fld>
             <a:endParaRPr lang="da-DK"/>
           </a:p>
@@ -2683,7 +2689,7 @@
           <a:p>
             <a:fld id="{CB8F57B5-8C2E-48A7-B7E0-7AAEE0FC24D8}" type="datetimeFigureOut">
               <a:rPr lang="da-DK" smtClean="0"/>
-              <a:t>14-08-2023</a:t>
+              <a:t>31-08-2023</a:t>
             </a:fld>
             <a:endParaRPr lang="da-DK"/>
           </a:p>
@@ -2926,7 +2932,7 @@
           <a:p>
             <a:fld id="{CB8F57B5-8C2E-48A7-B7E0-7AAEE0FC24D8}" type="datetimeFigureOut">
               <a:rPr lang="da-DK" smtClean="0"/>
-              <a:t>14-08-2023</a:t>
+              <a:t>31-08-2023</a:t>
             </a:fld>
             <a:endParaRPr lang="da-DK"/>
           </a:p>
@@ -3901,6 +3907,106 @@
 </p:sld>
 </file>
 
+<file path=ppt/slides/slide3.xml><?xml version="1.0" encoding="utf-8"?>
+<p:sld xmlns:a="http://schemas.openxmlformats.org/drawingml/2006/main" xmlns:r="http://schemas.openxmlformats.org/officeDocument/2006/relationships" xmlns:p="http://schemas.openxmlformats.org/presentationml/2006/main">
+  <p:cSld>
+    <p:spTree>
+      <p:nvGrpSpPr>
+        <p:cNvPr id="1" name=""/>
+        <p:cNvGrpSpPr/>
+        <p:nvPr/>
+      </p:nvGrpSpPr>
+      <p:grpSpPr>
+        <a:xfrm>
+          <a:off x="0" y="0"/>
+          <a:ext cx="0" cy="0"/>
+          <a:chOff x="0" y="0"/>
+          <a:chExt cx="0" cy="0"/>
+        </a:xfrm>
+      </p:grpSpPr>
+      <p:sp>
+        <p:nvSpPr>
+          <p:cNvPr id="2" name="Title 1">
+            <a:extLst>
+              <a:ext uri="{FF2B5EF4-FFF2-40B4-BE49-F238E27FC236}">
+                <a16:creationId xmlns:a16="http://schemas.microsoft.com/office/drawing/2014/main" id="{F570D7F3-A4AE-491B-19AE-EAC1033891FA}"/>
+              </a:ext>
+            </a:extLst>
+          </p:cNvPr>
+          <p:cNvSpPr>
+            <a:spLocks noGrp="1"/>
+          </p:cNvSpPr>
+          <p:nvPr>
+            <p:ph type="title"/>
+          </p:nvPr>
+        </p:nvSpPr>
+        <p:spPr/>
+        <p:txBody>
+          <a:bodyPr/>
+          <a:lstStyle/>
+          <a:p>
+            <a:r>
+              <a:rPr lang="en-US"/>
+              <a:t>Authorization</a:t>
+            </a:r>
+            <a:endParaRPr lang="da-DK"/>
+          </a:p>
+        </p:txBody>
+      </p:sp>
+      <p:sp>
+        <p:nvSpPr>
+          <p:cNvPr id="3" name="Content Placeholder 2">
+            <a:extLst>
+              <a:ext uri="{FF2B5EF4-FFF2-40B4-BE49-F238E27FC236}">
+                <a16:creationId xmlns:a16="http://schemas.microsoft.com/office/drawing/2014/main" id="{B83D410B-87C5-A734-9347-20AE2345FBB0}"/>
+              </a:ext>
+            </a:extLst>
+          </p:cNvPr>
+          <p:cNvSpPr>
+            <a:spLocks noGrp="1"/>
+          </p:cNvSpPr>
+          <p:nvPr>
+            <p:ph idx="1"/>
+          </p:nvPr>
+        </p:nvSpPr>
+        <p:spPr/>
+        <p:txBody>
+          <a:bodyPr/>
+          <a:lstStyle/>
+          <a:p>
+            <a:r>
+              <a:rPr lang="en-US"/>
+              <a:t>Happens in the backend based on username, not on roles or other information stored in the token.</a:t>
+            </a:r>
+          </a:p>
+          <a:p>
+            <a:r>
+              <a:rPr lang="en-US"/>
+              <a:t>This makes it possible to update user rights dynamically.</a:t>
+            </a:r>
+          </a:p>
+          <a:p>
+            <a:r>
+              <a:rPr lang="en-US"/>
+              <a:t>A downside is that the backend has to be queried on every visit (as opposed to storing a token in localstorage).</a:t>
+            </a:r>
+            <a:endParaRPr lang="da-DK"/>
+          </a:p>
+        </p:txBody>
+      </p:sp>
+    </p:spTree>
+    <p:extLst>
+      <p:ext uri="{BB962C8B-B14F-4D97-AF65-F5344CB8AC3E}">
+        <p14:creationId xmlns:p14="http://schemas.microsoft.com/office/powerpoint/2010/main" val="944763013"/>
+      </p:ext>
+    </p:extLst>
+  </p:cSld>
+  <p:clrMapOvr>
+    <a:masterClrMapping/>
+  </p:clrMapOvr>
+</p:sld>
+</file>
+
 <file path=ppt/theme/theme1.xml><?xml version="1.0" encoding="utf-8"?>
 <a:theme xmlns:a="http://schemas.openxmlformats.org/drawingml/2006/main" name="Office Theme">
   <a:themeElements>

</xml_diff>

<commit_message>
mqtt and .net 8
</commit_message>
<xml_diff>
--- a/Concept.pptx
+++ b/Concept.pptx
@@ -263,7 +263,7 @@
           <a:p>
             <a:fld id="{CB8F57B5-8C2E-48A7-B7E0-7AAEE0FC24D8}" type="datetimeFigureOut">
               <a:rPr lang="da-DK" smtClean="0"/>
-              <a:t>31-08-2023</a:t>
+              <a:t>28-12-2023</a:t>
             </a:fld>
             <a:endParaRPr lang="da-DK"/>
           </a:p>
@@ -463,7 +463,7 @@
           <a:p>
             <a:fld id="{CB8F57B5-8C2E-48A7-B7E0-7AAEE0FC24D8}" type="datetimeFigureOut">
               <a:rPr lang="da-DK" smtClean="0"/>
-              <a:t>31-08-2023</a:t>
+              <a:t>28-12-2023</a:t>
             </a:fld>
             <a:endParaRPr lang="da-DK"/>
           </a:p>
@@ -673,7 +673,7 @@
           <a:p>
             <a:fld id="{CB8F57B5-8C2E-48A7-B7E0-7AAEE0FC24D8}" type="datetimeFigureOut">
               <a:rPr lang="da-DK" smtClean="0"/>
-              <a:t>31-08-2023</a:t>
+              <a:t>28-12-2023</a:t>
             </a:fld>
             <a:endParaRPr lang="da-DK"/>
           </a:p>
@@ -873,7 +873,7 @@
           <a:p>
             <a:fld id="{CB8F57B5-8C2E-48A7-B7E0-7AAEE0FC24D8}" type="datetimeFigureOut">
               <a:rPr lang="da-DK" smtClean="0"/>
-              <a:t>31-08-2023</a:t>
+              <a:t>28-12-2023</a:t>
             </a:fld>
             <a:endParaRPr lang="da-DK"/>
           </a:p>
@@ -1149,7 +1149,7 @@
           <a:p>
             <a:fld id="{CB8F57B5-8C2E-48A7-B7E0-7AAEE0FC24D8}" type="datetimeFigureOut">
               <a:rPr lang="da-DK" smtClean="0"/>
-              <a:t>31-08-2023</a:t>
+              <a:t>28-12-2023</a:t>
             </a:fld>
             <a:endParaRPr lang="da-DK"/>
           </a:p>
@@ -1417,7 +1417,7 @@
           <a:p>
             <a:fld id="{CB8F57B5-8C2E-48A7-B7E0-7AAEE0FC24D8}" type="datetimeFigureOut">
               <a:rPr lang="da-DK" smtClean="0"/>
-              <a:t>31-08-2023</a:t>
+              <a:t>28-12-2023</a:t>
             </a:fld>
             <a:endParaRPr lang="da-DK"/>
           </a:p>
@@ -1832,7 +1832,7 @@
           <a:p>
             <a:fld id="{CB8F57B5-8C2E-48A7-B7E0-7AAEE0FC24D8}" type="datetimeFigureOut">
               <a:rPr lang="da-DK" smtClean="0"/>
-              <a:t>31-08-2023</a:t>
+              <a:t>28-12-2023</a:t>
             </a:fld>
             <a:endParaRPr lang="da-DK"/>
           </a:p>
@@ -1974,7 +1974,7 @@
           <a:p>
             <a:fld id="{CB8F57B5-8C2E-48A7-B7E0-7AAEE0FC24D8}" type="datetimeFigureOut">
               <a:rPr lang="da-DK" smtClean="0"/>
-              <a:t>31-08-2023</a:t>
+              <a:t>28-12-2023</a:t>
             </a:fld>
             <a:endParaRPr lang="da-DK"/>
           </a:p>
@@ -2087,7 +2087,7 @@
           <a:p>
             <a:fld id="{CB8F57B5-8C2E-48A7-B7E0-7AAEE0FC24D8}" type="datetimeFigureOut">
               <a:rPr lang="da-DK" smtClean="0"/>
-              <a:t>31-08-2023</a:t>
+              <a:t>28-12-2023</a:t>
             </a:fld>
             <a:endParaRPr lang="da-DK"/>
           </a:p>
@@ -2400,7 +2400,7 @@
           <a:p>
             <a:fld id="{CB8F57B5-8C2E-48A7-B7E0-7AAEE0FC24D8}" type="datetimeFigureOut">
               <a:rPr lang="da-DK" smtClean="0"/>
-              <a:t>31-08-2023</a:t>
+              <a:t>28-12-2023</a:t>
             </a:fld>
             <a:endParaRPr lang="da-DK"/>
           </a:p>
@@ -2689,7 +2689,7 @@
           <a:p>
             <a:fld id="{CB8F57B5-8C2E-48A7-B7E0-7AAEE0FC24D8}" type="datetimeFigureOut">
               <a:rPr lang="da-DK" smtClean="0"/>
-              <a:t>31-08-2023</a:t>
+              <a:t>28-12-2023</a:t>
             </a:fld>
             <a:endParaRPr lang="da-DK"/>
           </a:p>
@@ -2932,7 +2932,7 @@
           <a:p>
             <a:fld id="{CB8F57B5-8C2E-48A7-B7E0-7AAEE0FC24D8}" type="datetimeFigureOut">
               <a:rPr lang="da-DK" smtClean="0"/>
-              <a:t>31-08-2023</a:t>
+              <a:t>28-12-2023</a:t>
             </a:fld>
             <a:endParaRPr lang="da-DK"/>
           </a:p>
@@ -3451,8 +3451,8 @@
         </p:nvSpPr>
         <p:spPr>
           <a:xfrm>
-            <a:off x="4617720" y="3035807"/>
-            <a:ext cx="2770632" cy="1581913"/>
+            <a:off x="4933187" y="2953513"/>
+            <a:ext cx="2139696" cy="2340863"/>
           </a:xfrm>
           <a:prstGeom prst="roundRect">
             <a:avLst/>
@@ -3475,7 +3475,7 @@
           </a:fontRef>
         </p:style>
         <p:txBody>
-          <a:bodyPr rtlCol="0" anchor="ctr"/>
+          <a:bodyPr rtlCol="0" anchor="t"/>
           <a:lstStyle/>
           <a:p>
             <a:pPr algn="ctr"/>
@@ -3501,7 +3501,7 @@
         </p:nvSpPr>
         <p:spPr>
           <a:xfrm>
-            <a:off x="2087062" y="3456432"/>
+            <a:off x="2087062" y="3458857"/>
             <a:ext cx="1517904" cy="740664"/>
           </a:xfrm>
           <a:prstGeom prst="roundRect">
@@ -3604,8 +3604,8 @@
         </p:nvCxnSpPr>
         <p:spPr>
           <a:xfrm flipV="1">
-            <a:off x="2846014" y="4197096"/>
-            <a:ext cx="0" cy="950977"/>
+            <a:off x="2846014" y="4199521"/>
+            <a:ext cx="0" cy="948552"/>
           </a:xfrm>
           <a:prstGeom prst="straightConnector1">
             <a:avLst/>
@@ -3616,13 +3616,13 @@
         </p:spPr>
         <p:style>
           <a:lnRef idx="1">
-            <a:schemeClr val="accent1"/>
+            <a:schemeClr val="dk1"/>
           </a:lnRef>
           <a:fillRef idx="0">
-            <a:schemeClr val="accent1"/>
+            <a:schemeClr val="dk1"/>
           </a:fillRef>
           <a:effectRef idx="0">
-            <a:schemeClr val="accent1"/>
+            <a:schemeClr val="dk1"/>
           </a:effectRef>
           <a:fontRef idx="minor">
             <a:schemeClr val="tx1"/>
@@ -3641,14 +3641,14 @@
           <p:cNvCxnSpPr>
             <a:cxnSpLocks/>
             <a:stCxn id="5" idx="3"/>
-            <a:endCxn id="4" idx="1"/>
+            <a:endCxn id="25" idx="1"/>
           </p:cNvCxnSpPr>
           <p:nvPr/>
         </p:nvCxnSpPr>
         <p:spPr>
           <a:xfrm>
-            <a:off x="3604966" y="3826764"/>
-            <a:ext cx="1012754" cy="0"/>
+            <a:off x="3604966" y="3829189"/>
+            <a:ext cx="1417375" cy="0"/>
           </a:xfrm>
           <a:prstGeom prst="straightConnector1">
             <a:avLst/>
@@ -3659,13 +3659,13 @@
         </p:spPr>
         <p:style>
           <a:lnRef idx="1">
-            <a:schemeClr val="accent1"/>
+            <a:schemeClr val="dk1"/>
           </a:lnRef>
           <a:fillRef idx="0">
-            <a:schemeClr val="accent1"/>
+            <a:schemeClr val="dk1"/>
           </a:fillRef>
           <a:effectRef idx="0">
-            <a:schemeClr val="accent1"/>
+            <a:schemeClr val="dk1"/>
           </a:effectRef>
           <a:fontRef idx="minor">
             <a:schemeClr val="tx1"/>
@@ -3736,7 +3736,7 @@
         </p:nvSpPr>
         <p:spPr>
           <a:xfrm>
-            <a:off x="8401106" y="3456431"/>
+            <a:off x="8401106" y="3458857"/>
             <a:ext cx="1517904" cy="740664"/>
           </a:xfrm>
           <a:prstGeom prst="roundRect">
@@ -3782,15 +3782,16 @@
             </a:extLst>
           </p:cNvPr>
           <p:cNvCxnSpPr>
-            <a:stCxn id="4" idx="3"/>
+            <a:cxnSpLocks/>
+            <a:stCxn id="25" idx="3"/>
             <a:endCxn id="17" idx="1"/>
           </p:cNvCxnSpPr>
           <p:nvPr/>
         </p:nvCxnSpPr>
         <p:spPr>
-          <a:xfrm flipV="1">
-            <a:off x="7388352" y="3826763"/>
-            <a:ext cx="1012754" cy="1"/>
+          <a:xfrm>
+            <a:off x="6983729" y="3829189"/>
+            <a:ext cx="1417377" cy="0"/>
           </a:xfrm>
           <a:prstGeom prst="straightConnector1">
             <a:avLst/>
@@ -3802,13 +3803,13 @@
         </p:spPr>
         <p:style>
           <a:lnRef idx="1">
-            <a:schemeClr val="accent1"/>
+            <a:schemeClr val="dk1"/>
           </a:lnRef>
           <a:fillRef idx="0">
-            <a:schemeClr val="accent1"/>
+            <a:schemeClr val="dk1"/>
           </a:fillRef>
           <a:effectRef idx="0">
-            <a:schemeClr val="accent1"/>
+            <a:schemeClr val="dk1"/>
           </a:effectRef>
           <a:fontRef idx="minor">
             <a:schemeClr val="tx1"/>
@@ -3825,6 +3826,7 @@
             </a:extLst>
           </p:cNvPr>
           <p:cNvCxnSpPr>
+            <a:cxnSpLocks/>
             <a:stCxn id="4" idx="0"/>
             <a:endCxn id="14" idx="2"/>
           </p:cNvCxnSpPr>
@@ -3832,8 +3834,8 @@
         </p:nvCxnSpPr>
         <p:spPr>
           <a:xfrm flipV="1">
-            <a:off x="6003036" y="2142706"/>
-            <a:ext cx="0" cy="893101"/>
+            <a:off x="6003035" y="2142706"/>
+            <a:ext cx="1" cy="810807"/>
           </a:xfrm>
           <a:prstGeom prst="straightConnector1">
             <a:avLst/>
@@ -3845,13 +3847,13 @@
         </p:spPr>
         <p:style>
           <a:lnRef idx="1">
-            <a:schemeClr val="accent1"/>
+            <a:schemeClr val="dk1"/>
           </a:lnRef>
           <a:fillRef idx="0">
-            <a:schemeClr val="accent1"/>
+            <a:schemeClr val="dk1"/>
           </a:fillRef>
           <a:effectRef idx="0">
-            <a:schemeClr val="accent1"/>
+            <a:schemeClr val="dk1"/>
           </a:effectRef>
           <a:fontRef idx="minor">
             <a:schemeClr val="tx1"/>
@@ -3889,6 +3891,106 @@
             <a:r>
               <a:rPr lang="en-US"/>
               <a:t>REST/Websocket</a:t>
+            </a:r>
+            <a:endParaRPr lang="da-DK"/>
+          </a:p>
+        </p:txBody>
+      </p:sp>
+      <p:sp>
+        <p:nvSpPr>
+          <p:cNvPr id="2" name="Rectangle: Rounded Corners 1">
+            <a:extLst>
+              <a:ext uri="{FF2B5EF4-FFF2-40B4-BE49-F238E27FC236}">
+                <a16:creationId xmlns:a16="http://schemas.microsoft.com/office/drawing/2014/main" id="{4B9B4ED5-2F34-CE09-4E71-CFA81A52DDE3}"/>
+              </a:ext>
+            </a:extLst>
+          </p:cNvPr>
+          <p:cNvSpPr/>
+          <p:nvPr/>
+        </p:nvSpPr>
+        <p:spPr>
+          <a:xfrm>
+            <a:off x="5022341" y="4321236"/>
+            <a:ext cx="1961388" cy="740664"/>
+          </a:xfrm>
+          <a:prstGeom prst="roundRect">
+            <a:avLst/>
+          </a:prstGeom>
+        </p:spPr>
+        <p:style>
+          <a:lnRef idx="2">
+            <a:schemeClr val="accent1">
+              <a:shade val="15000"/>
+            </a:schemeClr>
+          </a:lnRef>
+          <a:fillRef idx="1">
+            <a:schemeClr val="accent1"/>
+          </a:fillRef>
+          <a:effectRef idx="0">
+            <a:schemeClr val="accent1"/>
+          </a:effectRef>
+          <a:fontRef idx="minor">
+            <a:schemeClr val="lt1"/>
+          </a:fontRef>
+        </p:style>
+        <p:txBody>
+          <a:bodyPr rtlCol="0" anchor="ctr"/>
+          <a:lstStyle/>
+          <a:p>
+            <a:pPr algn="ctr"/>
+            <a:r>
+              <a:rPr lang="en-US"/>
+              <a:t>login and user management</a:t>
+            </a:r>
+            <a:endParaRPr lang="da-DK"/>
+          </a:p>
+        </p:txBody>
+      </p:sp>
+      <p:sp>
+        <p:nvSpPr>
+          <p:cNvPr id="25" name="Rectangle: Rounded Corners 24">
+            <a:extLst>
+              <a:ext uri="{FF2B5EF4-FFF2-40B4-BE49-F238E27FC236}">
+                <a16:creationId xmlns:a16="http://schemas.microsoft.com/office/drawing/2014/main" id="{369AD458-C1A0-02A0-8AD6-F2F9766A2452}"/>
+              </a:ext>
+            </a:extLst>
+          </p:cNvPr>
+          <p:cNvSpPr/>
+          <p:nvPr/>
+        </p:nvSpPr>
+        <p:spPr>
+          <a:xfrm>
+            <a:off x="5022341" y="3458857"/>
+            <a:ext cx="1961388" cy="740664"/>
+          </a:xfrm>
+          <a:prstGeom prst="roundRect">
+            <a:avLst/>
+          </a:prstGeom>
+        </p:spPr>
+        <p:style>
+          <a:lnRef idx="2">
+            <a:schemeClr val="accent1">
+              <a:shade val="15000"/>
+            </a:schemeClr>
+          </a:lnRef>
+          <a:fillRef idx="1">
+            <a:schemeClr val="accent1"/>
+          </a:fillRef>
+          <a:effectRef idx="0">
+            <a:schemeClr val="accent1"/>
+          </a:effectRef>
+          <a:fontRef idx="minor">
+            <a:schemeClr val="lt1"/>
+          </a:fontRef>
+        </p:style>
+        <p:txBody>
+          <a:bodyPr rtlCol="0" anchor="ctr"/>
+          <a:lstStyle/>
+          <a:p>
+            <a:pPr algn="ctr"/>
+            <a:r>
+              <a:rPr lang="en-US"/>
+              <a:t>Data manager</a:t>
             </a:r>
             <a:endParaRPr lang="da-DK"/>
           </a:p>

</xml_diff>